<commit_message>
Revised slides a bit
</commit_message>
<xml_diff>
--- a/slides/MBA.pptx
+++ b/slides/MBA.pptx
@@ -3187,59 +3187,59 @@
           <a:bodyPr/>
           <a:lstStyle/>
           <a:p>
-            <a:pPr marL="399415" indent="-399415" defTabSz="496570">
+            <a:pPr marL="394715" indent="-394715" defTabSz="490727">
               <a:spcBef>
                 <a:spcPts val="2500"/>
               </a:spcBef>
               <a:buBlip>
                 <a:blip r:embed="rId2"/>
               </a:buBlip>
-              <a:defRPr sz="3230"/>
+              <a:defRPr sz="3191"/>
             </a:pPr>
             <a:r>
               <a:t>If support threshold is 0.30, then we drop (Apple, Milk), (Apple, Rice), (Milk, Rice), and (Beer, Rice)</a:t>
             </a:r>
           </a:p>
           <a:p>
-            <a:pPr lvl="1" marL="798830" indent="-399415" defTabSz="496570">
+            <a:pPr lvl="1" marL="789431" indent="-394715" defTabSz="490727">
               <a:spcBef>
                 <a:spcPts val="2500"/>
               </a:spcBef>
               <a:buBlip>
                 <a:blip r:embed="rId2"/>
               </a:buBlip>
-              <a:defRPr sz="3230"/>
+              <a:defRPr sz="3191"/>
             </a:pPr>
             <a:r>
               <a:t>Their Support is less than 0.30</a:t>
             </a:r>
           </a:p>
           <a:p>
-            <a:pPr marL="399415" indent="-399415" defTabSz="496570">
+            <a:pPr marL="394715" indent="-394715" defTabSz="490727">
               <a:spcBef>
                 <a:spcPts val="2500"/>
               </a:spcBef>
               <a:buBlip>
                 <a:blip r:embed="rId2"/>
               </a:buBlip>
-              <a:defRPr sz="3230"/>
+              <a:defRPr sz="3191"/>
             </a:pPr>
             <a:r>
               <a:t>Use remaining (Apple, Beer) and (Milk, Beer) to generate 3 itemsets</a:t>
             </a:r>
           </a:p>
           <a:p>
-            <a:pPr marL="399415" indent="-399415" defTabSz="496570">
+            <a:pPr marL="394715" indent="-394715" defTabSz="490727">
               <a:spcBef>
                 <a:spcPts val="2500"/>
               </a:spcBef>
               <a:buBlip>
                 <a:blip r:embed="rId2"/>
               </a:buBlip>
-              <a:defRPr sz="3230"/>
-            </a:pPr>
-            <a:r>
-              <a:t>Repeat this process until we reach Maximum length of itemset, Or we run out itemsets with minimum threshold</a:t>
+              <a:defRPr sz="3191"/>
+            </a:pPr>
+            <a:r>
+              <a:t>Repeat this process until we reach Maximum length of itemsets, Or we run out itemsets with minimum threshold</a:t>
             </a:r>
           </a:p>
         </p:txBody>
@@ -4693,7 +4693,7 @@
               </a:buBlip>
             </a:pPr>
             <a:r>
-              <a:t>Second, generate association rules satisfying some criteria </a:t>
+              <a:t>Second, generate association rules satisfying certain criteria </a:t>
             </a:r>
           </a:p>
           <a:p>
@@ -4767,6 +4767,10 @@
           </p:nvPr>
         </p:nvSpPr>
         <p:spPr>
+          <a:xfrm>
+            <a:off x="1270000" y="2857500"/>
+            <a:ext cx="10464800" cy="5842000"/>
+          </a:xfrm>
           <a:prstGeom prst="rect">
             <a:avLst/>
           </a:prstGeom>
@@ -4855,7 +4859,7 @@
               <a:defRPr sz="3382"/>
             </a:pPr>
             <a:r>
-              <a:t>Maximum length of itemset </a:t>
+              <a:t>Maximum length of itemsets </a:t>
             </a:r>
           </a:p>
         </p:txBody>

</xml_diff>